<commit_message>
Improve intro, add references, improve fork join dynamics
</commit_message>
<xml_diff>
--- a/Paper/intro_diagram.pptx
+++ b/Paper/intro_diagram.pptx
@@ -288,7 +288,7 @@
           <a:p>
             <a:fld id="{2BF10955-AA70-5443-93EC-3BA64AA8B781}" type="datetimeFigureOut">
               <a:rPr lang="en-US" smtClean="0"/>
-              <a:t>3/10/16</a:t>
+              <a:t>3/11/16</a:t>
             </a:fld>
             <a:endParaRPr lang="en-US"/>
           </a:p>
@@ -458,7 +458,7 @@
           <a:p>
             <a:fld id="{2BF10955-AA70-5443-93EC-3BA64AA8B781}" type="datetimeFigureOut">
               <a:rPr lang="en-US" smtClean="0"/>
-              <a:t>3/10/16</a:t>
+              <a:t>3/11/16</a:t>
             </a:fld>
             <a:endParaRPr lang="en-US"/>
           </a:p>
@@ -638,7 +638,7 @@
           <a:p>
             <a:fld id="{2BF10955-AA70-5443-93EC-3BA64AA8B781}" type="datetimeFigureOut">
               <a:rPr lang="en-US" smtClean="0"/>
-              <a:t>3/10/16</a:t>
+              <a:t>3/11/16</a:t>
             </a:fld>
             <a:endParaRPr lang="en-US"/>
           </a:p>
@@ -808,7 +808,7 @@
           <a:p>
             <a:fld id="{2BF10955-AA70-5443-93EC-3BA64AA8B781}" type="datetimeFigureOut">
               <a:rPr lang="en-US" smtClean="0"/>
-              <a:t>3/10/16</a:t>
+              <a:t>3/11/16</a:t>
             </a:fld>
             <a:endParaRPr lang="en-US"/>
           </a:p>
@@ -1054,7 +1054,7 @@
           <a:p>
             <a:fld id="{2BF10955-AA70-5443-93EC-3BA64AA8B781}" type="datetimeFigureOut">
               <a:rPr lang="en-US" smtClean="0"/>
-              <a:t>3/10/16</a:t>
+              <a:t>3/11/16</a:t>
             </a:fld>
             <a:endParaRPr lang="en-US"/>
           </a:p>
@@ -1342,7 +1342,7 @@
           <a:p>
             <a:fld id="{2BF10955-AA70-5443-93EC-3BA64AA8B781}" type="datetimeFigureOut">
               <a:rPr lang="en-US" smtClean="0"/>
-              <a:t>3/10/16</a:t>
+              <a:t>3/11/16</a:t>
             </a:fld>
             <a:endParaRPr lang="en-US"/>
           </a:p>
@@ -1764,7 +1764,7 @@
           <a:p>
             <a:fld id="{2BF10955-AA70-5443-93EC-3BA64AA8B781}" type="datetimeFigureOut">
               <a:rPr lang="en-US" smtClean="0"/>
-              <a:t>3/10/16</a:t>
+              <a:t>3/11/16</a:t>
             </a:fld>
             <a:endParaRPr lang="en-US"/>
           </a:p>
@@ -1882,7 +1882,7 @@
           <a:p>
             <a:fld id="{2BF10955-AA70-5443-93EC-3BA64AA8B781}" type="datetimeFigureOut">
               <a:rPr lang="en-US" smtClean="0"/>
-              <a:t>3/10/16</a:t>
+              <a:t>3/11/16</a:t>
             </a:fld>
             <a:endParaRPr lang="en-US"/>
           </a:p>
@@ -1977,7 +1977,7 @@
           <a:p>
             <a:fld id="{2BF10955-AA70-5443-93EC-3BA64AA8B781}" type="datetimeFigureOut">
               <a:rPr lang="en-US" smtClean="0"/>
-              <a:t>3/10/16</a:t>
+              <a:t>3/11/16</a:t>
             </a:fld>
             <a:endParaRPr lang="en-US"/>
           </a:p>
@@ -2254,7 +2254,7 @@
           <a:p>
             <a:fld id="{2BF10955-AA70-5443-93EC-3BA64AA8B781}" type="datetimeFigureOut">
               <a:rPr lang="en-US" smtClean="0"/>
-              <a:t>3/10/16</a:t>
+              <a:t>3/11/16</a:t>
             </a:fld>
             <a:endParaRPr lang="en-US"/>
           </a:p>
@@ -2507,7 +2507,7 @@
           <a:p>
             <a:fld id="{2BF10955-AA70-5443-93EC-3BA64AA8B781}" type="datetimeFigureOut">
               <a:rPr lang="en-US" smtClean="0"/>
-              <a:t>3/10/16</a:t>
+              <a:t>3/11/16</a:t>
             </a:fld>
             <a:endParaRPr lang="en-US"/>
           </a:p>
@@ -2720,7 +2720,7 @@
           <a:p>
             <a:fld id="{2BF10955-AA70-5443-93EC-3BA64AA8B781}" type="datetimeFigureOut">
               <a:rPr lang="en-US" smtClean="0"/>
-              <a:t>3/10/16</a:t>
+              <a:t>3/11/16</a:t>
             </a:fld>
             <a:endParaRPr lang="en-US"/>
           </a:p>
@@ -3103,8 +3103,8 @@
         </p:nvSpPr>
         <p:spPr>
           <a:xfrm>
-            <a:off x="3239481" y="1786470"/>
-            <a:ext cx="1144289" cy="369332"/>
+            <a:off x="3355663" y="1786470"/>
+            <a:ext cx="824414" cy="276999"/>
           </a:xfrm>
           <a:prstGeom prst="rect">
             <a:avLst/>
@@ -3118,10 +3118,10 @@
           <a:lstStyle/>
           <a:p>
             <a:r>
-              <a:rPr lang="en-US" dirty="0" smtClean="0"/>
+              <a:rPr lang="en-US" sz="1200" dirty="0" smtClean="0"/>
               <a:t>A: [0, 0, 0]</a:t>
             </a:r>
-            <a:endParaRPr lang="en-US" dirty="0"/>
+            <a:endParaRPr lang="en-US" sz="1200" dirty="0"/>
           </a:p>
         </p:txBody>
       </p:sp>
@@ -3133,8 +3133,8 @@
         </p:nvSpPr>
         <p:spPr>
           <a:xfrm>
-            <a:off x="2477077" y="2789058"/>
-            <a:ext cx="1136286" cy="369332"/>
+            <a:off x="2720696" y="2645119"/>
+            <a:ext cx="819079" cy="276999"/>
           </a:xfrm>
           <a:prstGeom prst="rect">
             <a:avLst/>
@@ -3148,14 +3148,14 @@
           <a:lstStyle/>
           <a:p>
             <a:r>
-              <a:rPr lang="en-US" dirty="0"/>
+              <a:rPr lang="en-US" sz="1200" dirty="0"/>
               <a:t>B</a:t>
             </a:r>
             <a:r>
-              <a:rPr lang="en-US" dirty="0" smtClean="0"/>
+              <a:rPr lang="en-US" sz="1200" dirty="0" smtClean="0"/>
               <a:t>: [3, 0, 0]</a:t>
             </a:r>
-            <a:endParaRPr lang="en-US" dirty="0"/>
+            <a:endParaRPr lang="en-US" sz="1200" dirty="0"/>
           </a:p>
         </p:txBody>
       </p:sp>
@@ -3170,8 +3170,8 @@
         </p:nvCxnSpPr>
         <p:spPr>
           <a:xfrm flipH="1">
-            <a:off x="3045220" y="2155802"/>
-            <a:ext cx="766406" cy="633256"/>
+            <a:off x="3130236" y="2063469"/>
+            <a:ext cx="637634" cy="581650"/>
           </a:xfrm>
           <a:prstGeom prst="straightConnector1">
             <a:avLst/>
@@ -3206,8 +3206,8 @@
         </p:nvSpPr>
         <p:spPr>
           <a:xfrm>
-            <a:off x="2412505" y="2198849"/>
-            <a:ext cx="1087633" cy="276999"/>
+            <a:off x="2563613" y="2139580"/>
+            <a:ext cx="967695" cy="246221"/>
           </a:xfrm>
           <a:prstGeom prst="rect">
             <a:avLst/>
@@ -3221,10 +3221,10 @@
           <a:lstStyle/>
           <a:p>
             <a:r>
-              <a:rPr lang="en-US" sz="1200" dirty="0" smtClean="0"/>
+              <a:rPr lang="en-US" sz="1000" i="1" dirty="0" smtClean="0"/>
               <a:t>B = set(A, 1, 3)</a:t>
             </a:r>
-            <a:endParaRPr lang="en-US" sz="1200" dirty="0"/>
+            <a:endParaRPr lang="en-US" sz="1000" i="1" dirty="0"/>
           </a:p>
         </p:txBody>
       </p:sp>
@@ -3236,8 +3236,8 @@
         </p:nvSpPr>
         <p:spPr>
           <a:xfrm>
-            <a:off x="4093159" y="2789058"/>
-            <a:ext cx="1133806" cy="369332"/>
+            <a:off x="4101626" y="2645119"/>
+            <a:ext cx="817426" cy="276999"/>
           </a:xfrm>
           <a:prstGeom prst="rect">
             <a:avLst/>
@@ -3251,10 +3251,10 @@
           <a:lstStyle/>
           <a:p>
             <a:r>
-              <a:rPr lang="en-US" dirty="0" smtClean="0"/>
+              <a:rPr lang="en-US" sz="1200" dirty="0" smtClean="0"/>
               <a:t>C: [5, 0, 0]</a:t>
             </a:r>
-            <a:endParaRPr lang="en-US" dirty="0"/>
+            <a:endParaRPr lang="en-US" sz="1200" dirty="0"/>
           </a:p>
         </p:txBody>
       </p:sp>
@@ -3269,8 +3269,8 @@
         </p:nvCxnSpPr>
         <p:spPr>
           <a:xfrm>
-            <a:off x="3811626" y="2155802"/>
-            <a:ext cx="848436" cy="633256"/>
+            <a:off x="3767870" y="2063469"/>
+            <a:ext cx="742469" cy="581650"/>
           </a:xfrm>
           <a:prstGeom prst="straightConnector1">
             <a:avLst/>
@@ -3305,8 +3305,8 @@
         </p:nvSpPr>
         <p:spPr>
           <a:xfrm>
-            <a:off x="4179292" y="2198849"/>
-            <a:ext cx="1085979" cy="276999"/>
+            <a:off x="4111556" y="2139580"/>
+            <a:ext cx="964940" cy="246221"/>
           </a:xfrm>
           <a:prstGeom prst="rect">
             <a:avLst/>
@@ -3320,14 +3320,14 @@
           <a:lstStyle/>
           <a:p>
             <a:r>
-              <a:rPr lang="en-US" sz="1200" dirty="0"/>
+              <a:rPr lang="en-US" sz="1000" i="1" dirty="0"/>
               <a:t>C</a:t>
             </a:r>
             <a:r>
-              <a:rPr lang="en-US" sz="1200" dirty="0" smtClean="0"/>
+              <a:rPr lang="en-US" sz="1000" i="1" dirty="0" smtClean="0"/>
               <a:t> = set(A, 1, 5)</a:t>
             </a:r>
-            <a:endParaRPr lang="en-US" sz="1200" dirty="0"/>
+            <a:endParaRPr lang="en-US" sz="1000" i="1" dirty="0"/>
           </a:p>
         </p:txBody>
       </p:sp>
@@ -3342,8 +3342,8 @@
         </p:nvCxnSpPr>
         <p:spPr>
           <a:xfrm>
-            <a:off x="4660062" y="3158390"/>
-            <a:ext cx="0" cy="672835"/>
+            <a:off x="4510339" y="2922118"/>
+            <a:ext cx="0" cy="485757"/>
           </a:xfrm>
           <a:prstGeom prst="straightConnector1">
             <a:avLst/>
@@ -3378,8 +3378,8 @@
         </p:nvSpPr>
         <p:spPr>
           <a:xfrm>
-            <a:off x="3531308" y="3285237"/>
-            <a:ext cx="1169611" cy="276999"/>
+            <a:off x="3539775" y="2988892"/>
+            <a:ext cx="1034633" cy="246221"/>
           </a:xfrm>
           <a:prstGeom prst="rect">
             <a:avLst/>
@@ -3393,14 +3393,10 @@
           <a:lstStyle/>
           <a:p>
             <a:r>
-              <a:rPr lang="en-US" sz="1200" dirty="0" smtClean="0"/>
-              <a:t>D = set(C, </a:t>
-            </a:r>
-            <a:r>
-              <a:rPr lang="en-US" sz="1200" dirty="0" smtClean="0"/>
-              <a:t>2, 11)</a:t>
-            </a:r>
-            <a:endParaRPr lang="en-US" sz="1200" dirty="0"/>
+              <a:rPr lang="en-US" sz="1000" i="1" dirty="0" smtClean="0"/>
+              <a:t>D = set(C, 2, 11)</a:t>
+            </a:r>
+            <a:endParaRPr lang="en-US" sz="1000" i="1" dirty="0"/>
           </a:p>
         </p:txBody>
       </p:sp>
@@ -3412,8 +3408,8 @@
         </p:nvSpPr>
         <p:spPr>
           <a:xfrm>
-            <a:off x="4025194" y="3831225"/>
-            <a:ext cx="1269736" cy="369332"/>
+            <a:off x="4056316" y="3407875"/>
+            <a:ext cx="908046" cy="276999"/>
           </a:xfrm>
           <a:prstGeom prst="rect">
             <a:avLst/>
@@ -3427,22 +3423,14 @@
           <a:lstStyle/>
           <a:p>
             <a:r>
-              <a:rPr lang="en-US" dirty="0"/>
+              <a:rPr lang="en-US" sz="1200" dirty="0"/>
               <a:t>D</a:t>
             </a:r>
             <a:r>
-              <a:rPr lang="en-US" dirty="0" smtClean="0"/>
-              <a:t>: [5, </a:t>
-            </a:r>
-            <a:r>
-              <a:rPr lang="en-US" dirty="0" smtClean="0"/>
-              <a:t>11, </a:t>
-            </a:r>
-            <a:r>
-              <a:rPr lang="en-US" dirty="0" smtClean="0"/>
-              <a:t>0]</a:t>
-            </a:r>
-            <a:endParaRPr lang="en-US" dirty="0"/>
+              <a:rPr lang="en-US" sz="1200" dirty="0" smtClean="0"/>
+              <a:t>: [5, 11, 0]</a:t>
+            </a:r>
+            <a:endParaRPr lang="en-US" sz="1200" dirty="0"/>
           </a:p>
         </p:txBody>
       </p:sp>
@@ -3454,8 +3442,8 @@
         </p:nvSpPr>
         <p:spPr>
           <a:xfrm>
-            <a:off x="3089989" y="1095697"/>
-            <a:ext cx="1443274" cy="276999"/>
+            <a:off x="3142650" y="1138032"/>
+            <a:ext cx="1270450" cy="246221"/>
           </a:xfrm>
           <a:prstGeom prst="rect">
             <a:avLst/>
@@ -3469,10 +3457,10 @@
           <a:lstStyle/>
           <a:p>
             <a:r>
-              <a:rPr lang="en-US" sz="1200" dirty="0" smtClean="0"/>
+              <a:rPr lang="en-US" sz="1000" i="1" dirty="0" smtClean="0"/>
               <a:t>A = tabulate(λx.0, 3)</a:t>
             </a:r>
-            <a:endParaRPr lang="en-US" sz="1200" dirty="0"/>
+            <a:endParaRPr lang="en-US" sz="1000" i="1" dirty="0"/>
           </a:p>
         </p:txBody>
       </p:sp>
@@ -3486,9 +3474,9 @@
           <p:nvPr/>
         </p:nvCxnSpPr>
         <p:spPr>
-          <a:xfrm>
-            <a:off x="3811626" y="1372696"/>
-            <a:ext cx="0" cy="413774"/>
+          <a:xfrm flipH="1">
+            <a:off x="3767870" y="1384253"/>
+            <a:ext cx="10005" cy="402217"/>
           </a:xfrm>
           <a:prstGeom prst="straightConnector1">
             <a:avLst/>

</xml_diff>